<commit_message>
added physical paper prototype printouts
</commit_message>
<xml_diff>
--- a/PaperPrototype/PaperPrototype.pptx
+++ b/PaperPrototype/PaperPrototype.pptx
@@ -116,16 +116,32 @@
 </p:presentation>
 </file>
 
-<file path=ppt/revisionInfo.xml><?xml version="1.0" encoding="utf-8"?>
-<p1510:revInfo xmlns:a="http://schemas.openxmlformats.org/drawingml/2006/main" xmlns:r="http://schemas.openxmlformats.org/officeDocument/2006/relationships" xmlns:p1510="http://schemas.microsoft.com/office/powerpoint/2015/10/main">
-  <p1510:revLst>
-    <p1510:client id="{A7F7962B-C4C5-47A1-BB2F-8E4B4E5F73C6}" v="4" dt="2022-02-27T23:20:13.998"/>
-  </p1510:revLst>
-</p1510:revInfo>
-</file>
-
 <file path=ppt/changesInfos/changesInfo1.xml><?xml version="1.0" encoding="utf-8"?>
 <pc:chgInfo xmlns:a="http://schemas.openxmlformats.org/drawingml/2006/main" xmlns:r="http://schemas.openxmlformats.org/officeDocument/2006/relationships" xmlns:ac="http://schemas.microsoft.com/office/drawing/2013/main/command" xmlns:pc="http://schemas.microsoft.com/office/powerpoint/2013/main/command">
+  <pc:docChgLst>
+    <pc:chgData name="James Ouk" userId="805f5bd89f6d97ab" providerId="LiveId" clId="{C314E367-A4B5-49F9-A587-0909747BDA20}"/>
+    <pc:docChg chg="modSld">
+      <pc:chgData name="James Ouk" userId="805f5bd89f6d97ab" providerId="LiveId" clId="{C314E367-A4B5-49F9-A587-0909747BDA20}" dt="2022-03-12T01:17:09.219" v="1" actId="14429"/>
+      <pc:docMkLst>
+        <pc:docMk/>
+      </pc:docMkLst>
+      <pc:sldChg chg="modSp mod">
+        <pc:chgData name="James Ouk" userId="805f5bd89f6d97ab" providerId="LiveId" clId="{C314E367-A4B5-49F9-A587-0909747BDA20}" dt="2022-03-12T01:17:09.219" v="1" actId="14429"/>
+        <pc:sldMkLst>
+          <pc:docMk/>
+          <pc:sldMk cId="3280544527" sldId="257"/>
+        </pc:sldMkLst>
+        <pc:grpChg chg="mod modVis">
+          <ac:chgData name="James Ouk" userId="805f5bd89f6d97ab" providerId="LiveId" clId="{C314E367-A4B5-49F9-A587-0909747BDA20}" dt="2022-03-12T01:17:09.219" v="1" actId="14429"/>
+          <ac:grpSpMkLst>
+            <pc:docMk/>
+            <pc:sldMk cId="3280544527" sldId="257"/>
+            <ac:grpSpMk id="21" creationId="{70281817-7BE6-4E2B-922F-1597C3FE6E2C}"/>
+          </ac:grpSpMkLst>
+        </pc:grpChg>
+      </pc:sldChg>
+    </pc:docChg>
+  </pc:docChgLst>
   <pc:docChgLst>
     <pc:chgData name="James Ouk" userId="805f5bd89f6d97ab" providerId="LiveId" clId="{A7F7962B-C4C5-47A1-BB2F-8E4B4E5F73C6}"/>
     <pc:docChg chg="undo custSel modSld">
@@ -275,7 +291,7 @@
           <a:p>
             <a:fld id="{AF7D96AA-967C-4E4F-B3A5-4BD91C2F3D3B}" type="datetimeFigureOut">
               <a:rPr lang="en-US" smtClean="0"/>
-              <a:t>3/3/2022</a:t>
+              <a:t>3/11/2022</a:t>
             </a:fld>
             <a:endParaRPr lang="en-US"/>
           </a:p>
@@ -858,7 +874,7 @@
           <a:p>
             <a:fld id="{4BE12112-EDD3-4913-A3F8-8103E3AA30C3}" type="datetimeFigureOut">
               <a:rPr lang="en-US" smtClean="0"/>
-              <a:t>3/3/2022</a:t>
+              <a:t>3/11/2022</a:t>
             </a:fld>
             <a:endParaRPr lang="en-US"/>
           </a:p>
@@ -1028,7 +1044,7 @@
           <a:p>
             <a:fld id="{4BE12112-EDD3-4913-A3F8-8103E3AA30C3}" type="datetimeFigureOut">
               <a:rPr lang="en-US" smtClean="0"/>
-              <a:t>3/3/2022</a:t>
+              <a:t>3/11/2022</a:t>
             </a:fld>
             <a:endParaRPr lang="en-US"/>
           </a:p>
@@ -1208,7 +1224,7 @@
           <a:p>
             <a:fld id="{4BE12112-EDD3-4913-A3F8-8103E3AA30C3}" type="datetimeFigureOut">
               <a:rPr lang="en-US" smtClean="0"/>
-              <a:t>3/3/2022</a:t>
+              <a:t>3/11/2022</a:t>
             </a:fld>
             <a:endParaRPr lang="en-US"/>
           </a:p>
@@ -1378,7 +1394,7 @@
           <a:p>
             <a:fld id="{4BE12112-EDD3-4913-A3F8-8103E3AA30C3}" type="datetimeFigureOut">
               <a:rPr lang="en-US" smtClean="0"/>
-              <a:t>3/3/2022</a:t>
+              <a:t>3/11/2022</a:t>
             </a:fld>
             <a:endParaRPr lang="en-US"/>
           </a:p>
@@ -1624,7 +1640,7 @@
           <a:p>
             <a:fld id="{4BE12112-EDD3-4913-A3F8-8103E3AA30C3}" type="datetimeFigureOut">
               <a:rPr lang="en-US" smtClean="0"/>
-              <a:t>3/3/2022</a:t>
+              <a:t>3/11/2022</a:t>
             </a:fld>
             <a:endParaRPr lang="en-US"/>
           </a:p>
@@ -1856,7 +1872,7 @@
           <a:p>
             <a:fld id="{4BE12112-EDD3-4913-A3F8-8103E3AA30C3}" type="datetimeFigureOut">
               <a:rPr lang="en-US" smtClean="0"/>
-              <a:t>3/3/2022</a:t>
+              <a:t>3/11/2022</a:t>
             </a:fld>
             <a:endParaRPr lang="en-US"/>
           </a:p>
@@ -2223,7 +2239,7 @@
           <a:p>
             <a:fld id="{4BE12112-EDD3-4913-A3F8-8103E3AA30C3}" type="datetimeFigureOut">
               <a:rPr lang="en-US" smtClean="0"/>
-              <a:t>3/3/2022</a:t>
+              <a:t>3/11/2022</a:t>
             </a:fld>
             <a:endParaRPr lang="en-US"/>
           </a:p>
@@ -2341,7 +2357,7 @@
           <a:p>
             <a:fld id="{4BE12112-EDD3-4913-A3F8-8103E3AA30C3}" type="datetimeFigureOut">
               <a:rPr lang="en-US" smtClean="0"/>
-              <a:t>3/3/2022</a:t>
+              <a:t>3/11/2022</a:t>
             </a:fld>
             <a:endParaRPr lang="en-US"/>
           </a:p>
@@ -2436,7 +2452,7 @@
           <a:p>
             <a:fld id="{4BE12112-EDD3-4913-A3F8-8103E3AA30C3}" type="datetimeFigureOut">
               <a:rPr lang="en-US" smtClean="0"/>
-              <a:t>3/3/2022</a:t>
+              <a:t>3/11/2022</a:t>
             </a:fld>
             <a:endParaRPr lang="en-US"/>
           </a:p>
@@ -2713,7 +2729,7 @@
           <a:p>
             <a:fld id="{4BE12112-EDD3-4913-A3F8-8103E3AA30C3}" type="datetimeFigureOut">
               <a:rPr lang="en-US" smtClean="0"/>
-              <a:t>3/3/2022</a:t>
+              <a:t>3/11/2022</a:t>
             </a:fld>
             <a:endParaRPr lang="en-US"/>
           </a:p>
@@ -2970,7 +2986,7 @@
           <a:p>
             <a:fld id="{4BE12112-EDD3-4913-A3F8-8103E3AA30C3}" type="datetimeFigureOut">
               <a:rPr lang="en-US" smtClean="0"/>
-              <a:t>3/3/2022</a:t>
+              <a:t>3/11/2022</a:t>
             </a:fld>
             <a:endParaRPr lang="en-US"/>
           </a:p>
@@ -3183,7 +3199,7 @@
           <a:p>
             <a:fld id="{4BE12112-EDD3-4913-A3F8-8103E3AA30C3}" type="datetimeFigureOut">
               <a:rPr lang="en-US" smtClean="0"/>
-              <a:t>3/3/2022</a:t>
+              <a:t>3/11/2022</a:t>
             </a:fld>
             <a:endParaRPr lang="en-US"/>
           </a:p>

</xml_diff>